<commit_message>
section 8 text added + related work extended (FiberScout)
</commit_message>
<xml_diff>
--- a/images/FiberScout_MetaTracts_GUI.pptx
+++ b/images/FiberScout_MetaTracts_GUI.pptx
@@ -289,7 +289,7 @@
           <a:p>
             <a:fld id="{357C6147-7F21-40A3-9D66-9B8EB1BDA9EE}" type="datetimeFigureOut">
               <a:rPr lang="en-US" smtClean="0"/>
-              <a:t>6/16/2015</a:t>
+              <a:t>6/17/2015</a:t>
             </a:fld>
             <a:endParaRPr lang="en-US"/>
           </a:p>
@@ -459,7 +459,7 @@
           <a:p>
             <a:fld id="{357C6147-7F21-40A3-9D66-9B8EB1BDA9EE}" type="datetimeFigureOut">
               <a:rPr lang="en-US" smtClean="0"/>
-              <a:t>6/16/2015</a:t>
+              <a:t>6/17/2015</a:t>
             </a:fld>
             <a:endParaRPr lang="en-US"/>
           </a:p>
@@ -639,7 +639,7 @@
           <a:p>
             <a:fld id="{357C6147-7F21-40A3-9D66-9B8EB1BDA9EE}" type="datetimeFigureOut">
               <a:rPr lang="en-US" smtClean="0"/>
-              <a:t>6/16/2015</a:t>
+              <a:t>6/17/2015</a:t>
             </a:fld>
             <a:endParaRPr lang="en-US"/>
           </a:p>
@@ -809,7 +809,7 @@
           <a:p>
             <a:fld id="{357C6147-7F21-40A3-9D66-9B8EB1BDA9EE}" type="datetimeFigureOut">
               <a:rPr lang="en-US" smtClean="0"/>
-              <a:t>6/16/2015</a:t>
+              <a:t>6/17/2015</a:t>
             </a:fld>
             <a:endParaRPr lang="en-US"/>
           </a:p>
@@ -1055,7 +1055,7 @@
           <a:p>
             <a:fld id="{357C6147-7F21-40A3-9D66-9B8EB1BDA9EE}" type="datetimeFigureOut">
               <a:rPr lang="en-US" smtClean="0"/>
-              <a:t>6/16/2015</a:t>
+              <a:t>6/17/2015</a:t>
             </a:fld>
             <a:endParaRPr lang="en-US"/>
           </a:p>
@@ -1343,7 +1343,7 @@
           <a:p>
             <a:fld id="{357C6147-7F21-40A3-9D66-9B8EB1BDA9EE}" type="datetimeFigureOut">
               <a:rPr lang="en-US" smtClean="0"/>
-              <a:t>6/16/2015</a:t>
+              <a:t>6/17/2015</a:t>
             </a:fld>
             <a:endParaRPr lang="en-US"/>
           </a:p>
@@ -1765,7 +1765,7 @@
           <a:p>
             <a:fld id="{357C6147-7F21-40A3-9D66-9B8EB1BDA9EE}" type="datetimeFigureOut">
               <a:rPr lang="en-US" smtClean="0"/>
-              <a:t>6/16/2015</a:t>
+              <a:t>6/17/2015</a:t>
             </a:fld>
             <a:endParaRPr lang="en-US"/>
           </a:p>
@@ -1883,7 +1883,7 @@
           <a:p>
             <a:fld id="{357C6147-7F21-40A3-9D66-9B8EB1BDA9EE}" type="datetimeFigureOut">
               <a:rPr lang="en-US" smtClean="0"/>
-              <a:t>6/16/2015</a:t>
+              <a:t>6/17/2015</a:t>
             </a:fld>
             <a:endParaRPr lang="en-US"/>
           </a:p>
@@ -1978,7 +1978,7 @@
           <a:p>
             <a:fld id="{357C6147-7F21-40A3-9D66-9B8EB1BDA9EE}" type="datetimeFigureOut">
               <a:rPr lang="en-US" smtClean="0"/>
-              <a:t>6/16/2015</a:t>
+              <a:t>6/17/2015</a:t>
             </a:fld>
             <a:endParaRPr lang="en-US"/>
           </a:p>
@@ -2255,7 +2255,7 @@
           <a:p>
             <a:fld id="{357C6147-7F21-40A3-9D66-9B8EB1BDA9EE}" type="datetimeFigureOut">
               <a:rPr lang="en-US" smtClean="0"/>
-              <a:t>6/16/2015</a:t>
+              <a:t>6/17/2015</a:t>
             </a:fld>
             <a:endParaRPr lang="en-US"/>
           </a:p>
@@ -2508,7 +2508,7 @@
           <a:p>
             <a:fld id="{357C6147-7F21-40A3-9D66-9B8EB1BDA9EE}" type="datetimeFigureOut">
               <a:rPr lang="en-US" smtClean="0"/>
-              <a:t>6/16/2015</a:t>
+              <a:t>6/17/2015</a:t>
             </a:fld>
             <a:endParaRPr lang="en-US"/>
           </a:p>
@@ -2721,7 +2721,7 @@
           <a:p>
             <a:fld id="{357C6147-7F21-40A3-9D66-9B8EB1BDA9EE}" type="datetimeFigureOut">
               <a:rPr lang="en-US" smtClean="0"/>
-              <a:t>6/16/2015</a:t>
+              <a:t>6/17/2015</a:t>
             </a:fld>
             <a:endParaRPr lang="en-US"/>
           </a:p>
@@ -3608,11 +3608,6 @@
                 </a:rPr>
                 <a:t>C</a:t>
               </a:r>
-              <a:endParaRPr lang="en-US" sz="8800" dirty="0">
-                <a:solidFill>
-                  <a:schemeClr val="bg1"/>
-                </a:solidFill>
-              </a:endParaRPr>
             </a:p>
           </p:txBody>
         </p:sp>
@@ -3761,8 +3756,8 @@
         </p:nvSpPr>
         <p:spPr>
           <a:xfrm>
-            <a:off x="0" y="496884"/>
-            <a:ext cx="10058400" cy="786610"/>
+            <a:off x="30478" y="496884"/>
+            <a:ext cx="9997201" cy="786610"/>
           </a:xfrm>
           <a:prstGeom prst="flowChartAlternateProcess">
             <a:avLst/>
@@ -3791,19 +3786,37 @@
           </a:fontRef>
         </p:style>
         <p:txBody>
-          <a:bodyPr rtlCol="0" anchor="ctr"/>
+          <a:bodyPr lIns="0" rIns="0" rtlCol="0" anchor="ctr">
+            <a:noAutofit/>
+          </a:bodyPr>
           <a:lstStyle/>
           <a:p>
             <a:pPr algn="ctr"/>
             <a:r>
-              <a:rPr lang="en-US" sz="3600" dirty="0" smtClean="0">
+              <a:rPr lang="en-US" sz="3550" dirty="0" smtClean="0">
                 <a:solidFill>
                   <a:srgbClr val="238B45"/>
                 </a:solidFill>
               </a:rPr>
-              <a:t>Graphical User Interface of the FiberScout tool</a:t>
-            </a:r>
-            <a:endParaRPr lang="en-US" sz="3600" dirty="0">
+              <a:t>Interactive fiber </a:t>
+            </a:r>
+            <a:r>
+              <a:rPr lang="en-US" sz="3550" dirty="0" smtClean="0">
+                <a:solidFill>
+                  <a:srgbClr val="238B45"/>
+                </a:solidFill>
+              </a:rPr>
+              <a:t>bundles analysis and exploration </a:t>
+            </a:r>
+            <a:r>
+              <a:rPr lang="en-US" sz="3550" dirty="0" smtClean="0">
+                <a:solidFill>
+                  <a:srgbClr val="238B45"/>
+                </a:solidFill>
+              </a:rPr>
+              <a:t>tool</a:t>
+            </a:r>
+            <a:endParaRPr lang="en-US" sz="3550" dirty="0">
               <a:solidFill>
                 <a:srgbClr val="238B45"/>
               </a:solidFill>
@@ -4069,11 +4082,6 @@
                 </a:rPr>
                 <a:t>C</a:t>
               </a:r>
-              <a:endParaRPr lang="en-US" sz="5400" dirty="0">
-                <a:solidFill>
-                  <a:schemeClr val="bg1"/>
-                </a:solidFill>
-              </a:endParaRPr>
             </a:p>
           </p:txBody>
         </p:sp>

</xml_diff>